<commit_message>
Signed-off-by: Haziq Ghani <haziqqbaharin@gmail.com>
</commit_message>
<xml_diff>
--- a/Covid-19 Dashboard.pptx
+++ b/Covid-19 Dashboard.pptx
@@ -9,21 +9,20 @@
     <p:sldId id="262" r:id="rId3"/>
     <p:sldId id="261" r:id="rId4"/>
     <p:sldId id="257" r:id="rId5"/>
-    <p:sldId id="258" r:id="rId6"/>
-    <p:sldId id="259" r:id="rId7"/>
-    <p:sldId id="263" r:id="rId8"/>
-    <p:sldId id="264" r:id="rId9"/>
-    <p:sldId id="265" r:id="rId10"/>
-    <p:sldId id="266" r:id="rId11"/>
-    <p:sldId id="272" r:id="rId12"/>
-    <p:sldId id="273" r:id="rId13"/>
-    <p:sldId id="274" r:id="rId14"/>
-    <p:sldId id="275" r:id="rId15"/>
-    <p:sldId id="267" r:id="rId16"/>
-    <p:sldId id="268" r:id="rId17"/>
-    <p:sldId id="269" r:id="rId18"/>
-    <p:sldId id="270" r:id="rId19"/>
-    <p:sldId id="271" r:id="rId20"/>
+    <p:sldId id="276" r:id="rId6"/>
+    <p:sldId id="258" r:id="rId7"/>
+    <p:sldId id="259" r:id="rId8"/>
+    <p:sldId id="263" r:id="rId9"/>
+    <p:sldId id="264" r:id="rId10"/>
+    <p:sldId id="265" r:id="rId11"/>
+    <p:sldId id="266" r:id="rId12"/>
+    <p:sldId id="272" r:id="rId13"/>
+    <p:sldId id="273" r:id="rId14"/>
+    <p:sldId id="267" r:id="rId15"/>
+    <p:sldId id="268" r:id="rId16"/>
+    <p:sldId id="269" r:id="rId17"/>
+    <p:sldId id="270" r:id="rId18"/>
+    <p:sldId id="271" r:id="rId19"/>
   </p:sldIdLst>
   <p:sldSz cx="12192000" cy="6858000"/>
   <p:notesSz cx="6858000" cy="9144000"/>
@@ -289,7 +288,7 @@
           <a:p>
             <a:fld id="{160E9DC4-4264-48D7-8CA1-8D2AF8B40227}" type="datetimeFigureOut">
               <a:rPr lang="en-US" smtClean="0"/>
-              <a:t>4/28/2020</a:t>
+              <a:t>4/29/2020</a:t>
             </a:fld>
             <a:endParaRPr lang="en-US"/>
           </a:p>
@@ -487,7 +486,7 @@
           <a:p>
             <a:fld id="{160E9DC4-4264-48D7-8CA1-8D2AF8B40227}" type="datetimeFigureOut">
               <a:rPr lang="en-US" smtClean="0"/>
-              <a:t>4/28/2020</a:t>
+              <a:t>4/29/2020</a:t>
             </a:fld>
             <a:endParaRPr lang="en-US"/>
           </a:p>
@@ -695,7 +694,7 @@
           <a:p>
             <a:fld id="{160E9DC4-4264-48D7-8CA1-8D2AF8B40227}" type="datetimeFigureOut">
               <a:rPr lang="en-US" smtClean="0"/>
-              <a:t>4/28/2020</a:t>
+              <a:t>4/29/2020</a:t>
             </a:fld>
             <a:endParaRPr lang="en-US"/>
           </a:p>
@@ -893,7 +892,7 @@
           <a:p>
             <a:fld id="{160E9DC4-4264-48D7-8CA1-8D2AF8B40227}" type="datetimeFigureOut">
               <a:rPr lang="en-US" smtClean="0"/>
-              <a:t>4/28/2020</a:t>
+              <a:t>4/29/2020</a:t>
             </a:fld>
             <a:endParaRPr lang="en-US"/>
           </a:p>
@@ -1168,7 +1167,7 @@
           <a:p>
             <a:fld id="{160E9DC4-4264-48D7-8CA1-8D2AF8B40227}" type="datetimeFigureOut">
               <a:rPr lang="en-US" smtClean="0"/>
-              <a:t>4/28/2020</a:t>
+              <a:t>4/29/2020</a:t>
             </a:fld>
             <a:endParaRPr lang="en-US"/>
           </a:p>
@@ -1433,7 +1432,7 @@
           <a:p>
             <a:fld id="{160E9DC4-4264-48D7-8CA1-8D2AF8B40227}" type="datetimeFigureOut">
               <a:rPr lang="en-US" smtClean="0"/>
-              <a:t>4/28/2020</a:t>
+              <a:t>4/29/2020</a:t>
             </a:fld>
             <a:endParaRPr lang="en-US"/>
           </a:p>
@@ -1845,7 +1844,7 @@
           <a:p>
             <a:fld id="{160E9DC4-4264-48D7-8CA1-8D2AF8B40227}" type="datetimeFigureOut">
               <a:rPr lang="en-US" smtClean="0"/>
-              <a:t>4/28/2020</a:t>
+              <a:t>4/29/2020</a:t>
             </a:fld>
             <a:endParaRPr lang="en-US"/>
           </a:p>
@@ -1986,7 +1985,7 @@
           <a:p>
             <a:fld id="{160E9DC4-4264-48D7-8CA1-8D2AF8B40227}" type="datetimeFigureOut">
               <a:rPr lang="en-US" smtClean="0"/>
-              <a:t>4/28/2020</a:t>
+              <a:t>4/29/2020</a:t>
             </a:fld>
             <a:endParaRPr lang="en-US"/>
           </a:p>
@@ -2099,7 +2098,7 @@
           <a:p>
             <a:fld id="{160E9DC4-4264-48D7-8CA1-8D2AF8B40227}" type="datetimeFigureOut">
               <a:rPr lang="en-US" smtClean="0"/>
-              <a:t>4/28/2020</a:t>
+              <a:t>4/29/2020</a:t>
             </a:fld>
             <a:endParaRPr lang="en-US"/>
           </a:p>
@@ -2410,7 +2409,7 @@
           <a:p>
             <a:fld id="{160E9DC4-4264-48D7-8CA1-8D2AF8B40227}" type="datetimeFigureOut">
               <a:rPr lang="en-US" smtClean="0"/>
-              <a:t>4/28/2020</a:t>
+              <a:t>4/29/2020</a:t>
             </a:fld>
             <a:endParaRPr lang="en-US"/>
           </a:p>
@@ -2698,7 +2697,7 @@
           <a:p>
             <a:fld id="{160E9DC4-4264-48D7-8CA1-8D2AF8B40227}" type="datetimeFigureOut">
               <a:rPr lang="en-US" smtClean="0"/>
-              <a:t>4/28/2020</a:t>
+              <a:t>4/29/2020</a:t>
             </a:fld>
             <a:endParaRPr lang="en-US"/>
           </a:p>
@@ -2939,7 +2938,7 @@
           <a:p>
             <a:fld id="{160E9DC4-4264-48D7-8CA1-8D2AF8B40227}" type="datetimeFigureOut">
               <a:rPr lang="en-US" smtClean="0"/>
-              <a:t>4/28/2020</a:t>
+              <a:t>4/29/2020</a:t>
             </a:fld>
             <a:endParaRPr lang="en-US"/>
           </a:p>
@@ -3458,7 +3457,7 @@
           <p:cNvPr id="2" name="Title 1">
             <a:extLst>
               <a:ext uri="{FF2B5EF4-FFF2-40B4-BE49-F238E27FC236}">
-                <a16:creationId xmlns:a16="http://schemas.microsoft.com/office/drawing/2014/main" id="{85E9CC80-88D1-44C6-AE16-5A3E8C514005}"/>
+                <a16:creationId xmlns:a16="http://schemas.microsoft.com/office/drawing/2014/main" id="{166200F9-E330-4241-AE28-2B92DE523A77}"/>
               </a:ext>
             </a:extLst>
           </p:cNvPr>
@@ -3467,57 +3466,95 @@
           </p:cNvSpPr>
           <p:nvPr>
             <p:ph type="title"/>
-          </p:nvPr>
-        </p:nvSpPr>
-        <p:spPr/>
-        <p:txBody>
-          <a:bodyPr/>
-          <a:lstStyle/>
-          <a:p>
-            <a:pPr algn="ctr"/>
-            <a:r>
-              <a:rPr lang="en-US" dirty="0"/>
-              <a:t>Amal Task</a:t>
-            </a:r>
-          </a:p>
-        </p:txBody>
-      </p:sp>
-      <p:sp>
-        <p:nvSpPr>
-          <p:cNvPr id="3" name="Content Placeholder 2">
-            <a:extLst>
-              <a:ext uri="{FF2B5EF4-FFF2-40B4-BE49-F238E27FC236}">
-                <a16:creationId xmlns:a16="http://schemas.microsoft.com/office/drawing/2014/main" id="{91AAF23D-22EA-40DB-89C2-199005E14BB2}"/>
-              </a:ext>
-            </a:extLst>
-          </p:cNvPr>
-          <p:cNvSpPr>
-            <a:spLocks noGrp="1"/>
-          </p:cNvSpPr>
-          <p:nvPr>
-            <p:ph idx="1"/>
           </p:nvPr>
         </p:nvSpPr>
         <p:spPr>
           <a:xfrm>
-            <a:off x="838200" y="3755256"/>
-            <a:ext cx="10515600" cy="2421708"/>
+            <a:off x="625136" y="-241711"/>
+            <a:ext cx="10515600" cy="1325563"/>
           </a:xfrm>
         </p:spPr>
         <p:txBody>
           <a:bodyPr/>
           <a:lstStyle/>
           <a:p>
+            <a:pPr algn="ctr"/>
+            <a:r>
+              <a:rPr lang="en-US" b="1" dirty="0" err="1"/>
+              <a:t>Haziq</a:t>
+            </a:r>
+            <a:r>
+              <a:rPr lang="en-US" b="1" dirty="0"/>
+              <a:t> Task</a:t>
+            </a:r>
+          </a:p>
+        </p:txBody>
+      </p:sp>
+      <p:sp>
+        <p:nvSpPr>
+          <p:cNvPr id="3" name="Content Placeholder 2">
+            <a:extLst>
+              <a:ext uri="{FF2B5EF4-FFF2-40B4-BE49-F238E27FC236}">
+                <a16:creationId xmlns:a16="http://schemas.microsoft.com/office/drawing/2014/main" id="{14C0FA9B-0D59-4101-833A-5835429CBAC2}"/>
+              </a:ext>
+            </a:extLst>
+          </p:cNvPr>
+          <p:cNvSpPr>
+            <a:spLocks noGrp="1"/>
+          </p:cNvSpPr>
+          <p:nvPr>
+            <p:ph idx="1"/>
+          </p:nvPr>
+        </p:nvSpPr>
+        <p:spPr>
+          <a:xfrm>
+            <a:off x="838200" y="4001287"/>
+            <a:ext cx="10515600" cy="2506045"/>
+          </a:xfrm>
+        </p:spPr>
+        <p:txBody>
+          <a:bodyPr>
+            <a:normAutofit fontScale="92500" lnSpcReduction="20000"/>
+          </a:bodyPr>
+          <a:lstStyle/>
+          <a:p>
+            <a:r>
+              <a:rPr lang="en-US" dirty="0" err="1"/>
+              <a:t>Haziq’s</a:t>
+            </a:r>
             <a:r>
               <a:rPr lang="en-US" dirty="0"/>
-              <a:t>Amal’s task was to created three line graphs of March with Confirmed, Death and Recovered cases. </a:t>
+              <a:t> task was to created interactive map that shows individual country with information by hovering around using tooltip. </a:t>
             </a:r>
           </a:p>
           <a:p>
             <a:r>
               <a:rPr lang="en-US" dirty="0"/>
-              <a:t>This show the tally of day in the month of March.</a:t>
-            </a:r>
+              <a:t>Each country contains the name, number of confirmed cases, deaths and recovered.  </a:t>
+            </a:r>
+          </a:p>
+          <a:p>
+            <a:r>
+              <a:rPr lang="en-US" dirty="0"/>
+              <a:t>Zooming capabilities with d3 zoom function.</a:t>
+            </a:r>
+          </a:p>
+          <a:p>
+            <a:r>
+              <a:rPr lang="en-US" dirty="0"/>
+              <a:t>Utilizing </a:t>
+            </a:r>
+            <a:r>
+              <a:rPr lang="en-US" dirty="0" err="1"/>
+              <a:t>topojson</a:t>
+            </a:r>
+            <a:r>
+              <a:rPr lang="en-US" dirty="0"/>
+              <a:t> dataset by linking country id with covid-19 dataset to fetch necessary data and features. </a:t>
+            </a:r>
+          </a:p>
+          <a:p>
+            <a:endParaRPr lang="en-US" dirty="0"/>
           </a:p>
         </p:txBody>
       </p:sp>
@@ -3526,7 +3563,7 @@
           <p:cNvPr id="4" name="Picture 3">
             <a:extLst>
               <a:ext uri="{FF2B5EF4-FFF2-40B4-BE49-F238E27FC236}">
-                <a16:creationId xmlns:a16="http://schemas.microsoft.com/office/drawing/2014/main" id="{73C4A677-990E-4612-8398-31EE142E983A}"/>
+                <a16:creationId xmlns:a16="http://schemas.microsoft.com/office/drawing/2014/main" id="{B03873DF-4687-4E27-AE63-088B54A0B9F7}"/>
               </a:ext>
             </a:extLst>
           </p:cNvPr>
@@ -3537,186 +3574,23 @@
         </p:nvPicPr>
         <p:blipFill rotWithShape="1">
           <a:blip r:embed="rId2"/>
-          <a:srcRect l="11068" t="11650" r="58204" b="64531"/>
+          <a:srcRect l="13762" t="22006" r="12912" b="34757"/>
           <a:stretch/>
         </p:blipFill>
         <p:spPr>
           <a:xfrm>
-            <a:off x="390618" y="1509203"/>
-            <a:ext cx="3746377" cy="1633492"/>
+            <a:off x="1365413" y="773135"/>
+            <a:ext cx="9017762" cy="2990997"/>
           </a:xfrm>
           <a:prstGeom prst="rect">
             <a:avLst/>
           </a:prstGeom>
         </p:spPr>
       </p:pic>
-      <p:pic>
-        <p:nvPicPr>
-          <p:cNvPr id="5" name="Picture 4">
-            <a:extLst>
-              <a:ext uri="{FF2B5EF4-FFF2-40B4-BE49-F238E27FC236}">
-                <a16:creationId xmlns:a16="http://schemas.microsoft.com/office/drawing/2014/main" id="{79D2682C-4C85-4F45-A584-CC0D18971123}"/>
-              </a:ext>
-            </a:extLst>
-          </p:cNvPr>
-          <p:cNvPicPr>
-            <a:picLocks noChangeAspect="1"/>
-          </p:cNvPicPr>
-          <p:nvPr/>
-        </p:nvPicPr>
-        <p:blipFill rotWithShape="1">
-          <a:blip r:embed="rId2"/>
-          <a:srcRect l="54175" t="11521" r="16408" b="64660"/>
-          <a:stretch/>
-        </p:blipFill>
-        <p:spPr>
-          <a:xfrm>
-            <a:off x="4584577" y="1509203"/>
-            <a:ext cx="3586579" cy="1633492"/>
-          </a:xfrm>
-          <a:prstGeom prst="rect">
-            <a:avLst/>
-          </a:prstGeom>
-        </p:spPr>
-      </p:pic>
-      <p:pic>
-        <p:nvPicPr>
-          <p:cNvPr id="6" name="Picture 5">
-            <a:extLst>
-              <a:ext uri="{FF2B5EF4-FFF2-40B4-BE49-F238E27FC236}">
-                <a16:creationId xmlns:a16="http://schemas.microsoft.com/office/drawing/2014/main" id="{BCB9653F-44A8-4C4C-96D6-A59714A73B76}"/>
-              </a:ext>
-            </a:extLst>
-          </p:cNvPr>
-          <p:cNvPicPr>
-            <a:picLocks noChangeAspect="1"/>
-          </p:cNvPicPr>
-          <p:nvPr/>
-        </p:nvPicPr>
-        <p:blipFill rotWithShape="1">
-          <a:blip r:embed="rId2"/>
-          <a:srcRect l="32913" t="41215" r="37670" b="34967"/>
-          <a:stretch/>
-        </p:blipFill>
-        <p:spPr>
-          <a:xfrm>
-            <a:off x="8522563" y="1509203"/>
-            <a:ext cx="3586579" cy="1633492"/>
-          </a:xfrm>
-          <a:prstGeom prst="rect">
-            <a:avLst/>
-          </a:prstGeom>
-        </p:spPr>
-      </p:pic>
-      <p:sp>
-        <p:nvSpPr>
-          <p:cNvPr id="7" name="TextBox 6">
-            <a:extLst>
-              <a:ext uri="{FF2B5EF4-FFF2-40B4-BE49-F238E27FC236}">
-                <a16:creationId xmlns:a16="http://schemas.microsoft.com/office/drawing/2014/main" id="{F91971AA-3D61-4D4D-A4E7-2EFFFE74D664}"/>
-              </a:ext>
-            </a:extLst>
-          </p:cNvPr>
-          <p:cNvSpPr txBox="1"/>
-          <p:nvPr/>
-        </p:nvSpPr>
-        <p:spPr>
-          <a:xfrm>
-            <a:off x="1464816" y="3244334"/>
-            <a:ext cx="1757469" cy="369332"/>
-          </a:xfrm>
-          <a:prstGeom prst="rect">
-            <a:avLst/>
-          </a:prstGeom>
-          <a:noFill/>
-        </p:spPr>
-        <p:txBody>
-          <a:bodyPr wrap="none" rtlCol="0">
-            <a:spAutoFit/>
-          </a:bodyPr>
-          <a:lstStyle/>
-          <a:p>
-            <a:r>
-              <a:rPr lang="en-US" dirty="0"/>
-              <a:t>Confirmed Cases</a:t>
-            </a:r>
-          </a:p>
-        </p:txBody>
-      </p:sp>
-      <p:sp>
-        <p:nvSpPr>
-          <p:cNvPr id="8" name="TextBox 7">
-            <a:extLst>
-              <a:ext uri="{FF2B5EF4-FFF2-40B4-BE49-F238E27FC236}">
-                <a16:creationId xmlns:a16="http://schemas.microsoft.com/office/drawing/2014/main" id="{069B15A2-BF3A-4477-A327-9D127AB2D5C4}"/>
-              </a:ext>
-            </a:extLst>
-          </p:cNvPr>
-          <p:cNvSpPr txBox="1"/>
-          <p:nvPr/>
-        </p:nvSpPr>
-        <p:spPr>
-          <a:xfrm>
-            <a:off x="5814874" y="3264309"/>
-            <a:ext cx="1331903" cy="369332"/>
-          </a:xfrm>
-          <a:prstGeom prst="rect">
-            <a:avLst/>
-          </a:prstGeom>
-          <a:noFill/>
-        </p:spPr>
-        <p:txBody>
-          <a:bodyPr wrap="none" rtlCol="0">
-            <a:spAutoFit/>
-          </a:bodyPr>
-          <a:lstStyle/>
-          <a:p>
-            <a:r>
-              <a:rPr lang="en-US" dirty="0"/>
-              <a:t>Death Cases</a:t>
-            </a:r>
-          </a:p>
-        </p:txBody>
-      </p:sp>
-      <p:sp>
-        <p:nvSpPr>
-          <p:cNvPr id="9" name="TextBox 8">
-            <a:extLst>
-              <a:ext uri="{FF2B5EF4-FFF2-40B4-BE49-F238E27FC236}">
-                <a16:creationId xmlns:a16="http://schemas.microsoft.com/office/drawing/2014/main" id="{C139B0B6-0763-4CCD-AF87-4D85B75A224A}"/>
-              </a:ext>
-            </a:extLst>
-          </p:cNvPr>
-          <p:cNvSpPr txBox="1"/>
-          <p:nvPr/>
-        </p:nvSpPr>
-        <p:spPr>
-          <a:xfrm>
-            <a:off x="9739366" y="3244334"/>
-            <a:ext cx="1751377" cy="369332"/>
-          </a:xfrm>
-          <a:prstGeom prst="rect">
-            <a:avLst/>
-          </a:prstGeom>
-          <a:noFill/>
-        </p:spPr>
-        <p:txBody>
-          <a:bodyPr wrap="none" rtlCol="0">
-            <a:spAutoFit/>
-          </a:bodyPr>
-          <a:lstStyle/>
-          <a:p>
-            <a:r>
-              <a:rPr lang="en-US" dirty="0"/>
-              <a:t>Recovered Cases</a:t>
-            </a:r>
-          </a:p>
-        </p:txBody>
-      </p:sp>
     </p:spTree>
     <p:extLst>
       <p:ext uri="{BB962C8B-B14F-4D97-AF65-F5344CB8AC3E}">
-        <p14:creationId xmlns:p14="http://schemas.microsoft.com/office/powerpoint/2010/main" val="3459930867"/>
+        <p14:creationId xmlns:p14="http://schemas.microsoft.com/office/powerpoint/2010/main" val="1770772489"/>
       </p:ext>
     </p:extLst>
   </p:cSld>
@@ -3748,7 +3622,7 @@
           <p:cNvPr id="2" name="Title 1">
             <a:extLst>
               <a:ext uri="{FF2B5EF4-FFF2-40B4-BE49-F238E27FC236}">
-                <a16:creationId xmlns:a16="http://schemas.microsoft.com/office/drawing/2014/main" id="{28DA78EB-ABA9-46E9-B912-CF67F89D53C2}"/>
+                <a16:creationId xmlns:a16="http://schemas.microsoft.com/office/drawing/2014/main" id="{85E9CC80-88D1-44C6-AE16-5A3E8C514005}"/>
               </a:ext>
             </a:extLst>
           </p:cNvPr>
@@ -3764,10 +3638,296 @@
           <a:bodyPr/>
           <a:lstStyle/>
           <a:p>
-            <a:endParaRPr lang="en-US"/>
-          </a:p>
-        </p:txBody>
-      </p:sp>
+            <a:pPr algn="ctr"/>
+            <a:r>
+              <a:rPr lang="en-US" b="1" dirty="0"/>
+              <a:t>Amal Task</a:t>
+            </a:r>
+          </a:p>
+        </p:txBody>
+      </p:sp>
+      <p:sp>
+        <p:nvSpPr>
+          <p:cNvPr id="3" name="Content Placeholder 2">
+            <a:extLst>
+              <a:ext uri="{FF2B5EF4-FFF2-40B4-BE49-F238E27FC236}">
+                <a16:creationId xmlns:a16="http://schemas.microsoft.com/office/drawing/2014/main" id="{91AAF23D-22EA-40DB-89C2-199005E14BB2}"/>
+              </a:ext>
+            </a:extLst>
+          </p:cNvPr>
+          <p:cNvSpPr>
+            <a:spLocks noGrp="1"/>
+          </p:cNvSpPr>
+          <p:nvPr>
+            <p:ph idx="1"/>
+          </p:nvPr>
+        </p:nvSpPr>
+        <p:spPr>
+          <a:xfrm>
+            <a:off x="838200" y="3755256"/>
+            <a:ext cx="10515600" cy="2421708"/>
+          </a:xfrm>
+        </p:spPr>
+        <p:txBody>
+          <a:bodyPr/>
+          <a:lstStyle/>
+          <a:p>
+            <a:pPr algn="just"/>
+            <a:r>
+              <a:rPr lang="en-US" sz="2400" dirty="0" err="1"/>
+              <a:t>Amal’s</a:t>
+            </a:r>
+            <a:r>
+              <a:rPr lang="en-US" sz="2400" dirty="0"/>
+              <a:t> task was to create three line charts with 3 different cases</a:t>
+            </a:r>
+          </a:p>
+          <a:p>
+            <a:pPr lvl="1" algn="just"/>
+            <a:r>
+              <a:rPr lang="en-US" sz="2000" dirty="0"/>
+              <a:t>Confirmed cases (Blue), Death cases (Red), Recovered cases(Green).</a:t>
+            </a:r>
+          </a:p>
+          <a:p>
+            <a:pPr algn="just"/>
+            <a:r>
+              <a:rPr lang="en-US" sz="2400" dirty="0"/>
+              <a:t>The line chart displays the total number of cases by weekly for the month of march 2020. It shows the total value for all countries for each cases.</a:t>
+            </a:r>
+          </a:p>
+          <a:p>
+            <a:pPr algn="just"/>
+            <a:r>
+              <a:rPr lang="en-US" sz="2400" dirty="0"/>
+              <a:t>By using the tooltips, the information such as date and total number of the cases per week will be shown when pointing to the dot. </a:t>
+            </a:r>
+            <a:endParaRPr lang="en-US" sz="2400" dirty="0"/>
+          </a:p>
+        </p:txBody>
+      </p:sp>
+      <p:pic>
+        <p:nvPicPr>
+          <p:cNvPr id="4" name="Picture 3">
+            <a:extLst>
+              <a:ext uri="{FF2B5EF4-FFF2-40B4-BE49-F238E27FC236}">
+                <a16:creationId xmlns:a16="http://schemas.microsoft.com/office/drawing/2014/main" id="{73C4A677-990E-4612-8398-31EE142E983A}"/>
+              </a:ext>
+            </a:extLst>
+          </p:cNvPr>
+          <p:cNvPicPr>
+            <a:picLocks noChangeAspect="1"/>
+          </p:cNvPicPr>
+          <p:nvPr/>
+        </p:nvPicPr>
+        <p:blipFill rotWithShape="1">
+          <a:blip r:embed="rId2"/>
+          <a:srcRect l="11068" t="11650" r="58204" b="64531"/>
+          <a:stretch/>
+        </p:blipFill>
+        <p:spPr>
+          <a:xfrm>
+            <a:off x="390618" y="1509203"/>
+            <a:ext cx="3746377" cy="1633492"/>
+          </a:xfrm>
+          <a:prstGeom prst="rect">
+            <a:avLst/>
+          </a:prstGeom>
+        </p:spPr>
+      </p:pic>
+      <p:pic>
+        <p:nvPicPr>
+          <p:cNvPr id="5" name="Picture 4">
+            <a:extLst>
+              <a:ext uri="{FF2B5EF4-FFF2-40B4-BE49-F238E27FC236}">
+                <a16:creationId xmlns:a16="http://schemas.microsoft.com/office/drawing/2014/main" id="{79D2682C-4C85-4F45-A584-CC0D18971123}"/>
+              </a:ext>
+            </a:extLst>
+          </p:cNvPr>
+          <p:cNvPicPr>
+            <a:picLocks noChangeAspect="1"/>
+          </p:cNvPicPr>
+          <p:nvPr/>
+        </p:nvPicPr>
+        <p:blipFill rotWithShape="1">
+          <a:blip r:embed="rId2"/>
+          <a:srcRect l="54175" t="11521" r="16408" b="64660"/>
+          <a:stretch/>
+        </p:blipFill>
+        <p:spPr>
+          <a:xfrm>
+            <a:off x="4584577" y="1509203"/>
+            <a:ext cx="3586579" cy="1633492"/>
+          </a:xfrm>
+          <a:prstGeom prst="rect">
+            <a:avLst/>
+          </a:prstGeom>
+        </p:spPr>
+      </p:pic>
+      <p:pic>
+        <p:nvPicPr>
+          <p:cNvPr id="6" name="Picture 5">
+            <a:extLst>
+              <a:ext uri="{FF2B5EF4-FFF2-40B4-BE49-F238E27FC236}">
+                <a16:creationId xmlns:a16="http://schemas.microsoft.com/office/drawing/2014/main" id="{BCB9653F-44A8-4C4C-96D6-A59714A73B76}"/>
+              </a:ext>
+            </a:extLst>
+          </p:cNvPr>
+          <p:cNvPicPr>
+            <a:picLocks noChangeAspect="1"/>
+          </p:cNvPicPr>
+          <p:nvPr/>
+        </p:nvPicPr>
+        <p:blipFill rotWithShape="1">
+          <a:blip r:embed="rId2"/>
+          <a:srcRect l="32913" t="41215" r="37670" b="34967"/>
+          <a:stretch/>
+        </p:blipFill>
+        <p:spPr>
+          <a:xfrm>
+            <a:off x="8522563" y="1509203"/>
+            <a:ext cx="3586579" cy="1633492"/>
+          </a:xfrm>
+          <a:prstGeom prst="rect">
+            <a:avLst/>
+          </a:prstGeom>
+        </p:spPr>
+      </p:pic>
+      <p:sp>
+        <p:nvSpPr>
+          <p:cNvPr id="7" name="TextBox 6">
+            <a:extLst>
+              <a:ext uri="{FF2B5EF4-FFF2-40B4-BE49-F238E27FC236}">
+                <a16:creationId xmlns:a16="http://schemas.microsoft.com/office/drawing/2014/main" id="{F91971AA-3D61-4D4D-A4E7-2EFFFE74D664}"/>
+              </a:ext>
+            </a:extLst>
+          </p:cNvPr>
+          <p:cNvSpPr txBox="1"/>
+          <p:nvPr/>
+        </p:nvSpPr>
+        <p:spPr>
+          <a:xfrm>
+            <a:off x="1464816" y="3244334"/>
+            <a:ext cx="1757469" cy="369332"/>
+          </a:xfrm>
+          <a:prstGeom prst="rect">
+            <a:avLst/>
+          </a:prstGeom>
+          <a:noFill/>
+        </p:spPr>
+        <p:txBody>
+          <a:bodyPr wrap="none" rtlCol="0">
+            <a:spAutoFit/>
+          </a:bodyPr>
+          <a:lstStyle/>
+          <a:p>
+            <a:r>
+              <a:rPr lang="en-US" dirty="0"/>
+              <a:t>Confirmed Cases</a:t>
+            </a:r>
+          </a:p>
+        </p:txBody>
+      </p:sp>
+      <p:sp>
+        <p:nvSpPr>
+          <p:cNvPr id="8" name="TextBox 7">
+            <a:extLst>
+              <a:ext uri="{FF2B5EF4-FFF2-40B4-BE49-F238E27FC236}">
+                <a16:creationId xmlns:a16="http://schemas.microsoft.com/office/drawing/2014/main" id="{069B15A2-BF3A-4477-A327-9D127AB2D5C4}"/>
+              </a:ext>
+            </a:extLst>
+          </p:cNvPr>
+          <p:cNvSpPr txBox="1"/>
+          <p:nvPr/>
+        </p:nvSpPr>
+        <p:spPr>
+          <a:xfrm>
+            <a:off x="5814874" y="3264309"/>
+            <a:ext cx="1331903" cy="369332"/>
+          </a:xfrm>
+          <a:prstGeom prst="rect">
+            <a:avLst/>
+          </a:prstGeom>
+          <a:noFill/>
+        </p:spPr>
+        <p:txBody>
+          <a:bodyPr wrap="none" rtlCol="0">
+            <a:spAutoFit/>
+          </a:bodyPr>
+          <a:lstStyle/>
+          <a:p>
+            <a:r>
+              <a:rPr lang="en-US" dirty="0"/>
+              <a:t>Death Cases</a:t>
+            </a:r>
+          </a:p>
+        </p:txBody>
+      </p:sp>
+      <p:sp>
+        <p:nvSpPr>
+          <p:cNvPr id="9" name="TextBox 8">
+            <a:extLst>
+              <a:ext uri="{FF2B5EF4-FFF2-40B4-BE49-F238E27FC236}">
+                <a16:creationId xmlns:a16="http://schemas.microsoft.com/office/drawing/2014/main" id="{C139B0B6-0763-4CCD-AF87-4D85B75A224A}"/>
+              </a:ext>
+            </a:extLst>
+          </p:cNvPr>
+          <p:cNvSpPr txBox="1"/>
+          <p:nvPr/>
+        </p:nvSpPr>
+        <p:spPr>
+          <a:xfrm>
+            <a:off x="9739366" y="3244334"/>
+            <a:ext cx="1751377" cy="369332"/>
+          </a:xfrm>
+          <a:prstGeom prst="rect">
+            <a:avLst/>
+          </a:prstGeom>
+          <a:noFill/>
+        </p:spPr>
+        <p:txBody>
+          <a:bodyPr wrap="none" rtlCol="0">
+            <a:spAutoFit/>
+          </a:bodyPr>
+          <a:lstStyle/>
+          <a:p>
+            <a:r>
+              <a:rPr lang="en-US" dirty="0"/>
+              <a:t>Recovered Cases</a:t>
+            </a:r>
+          </a:p>
+        </p:txBody>
+      </p:sp>
+    </p:spTree>
+    <p:extLst>
+      <p:ext uri="{BB962C8B-B14F-4D97-AF65-F5344CB8AC3E}">
+        <p14:creationId xmlns:p14="http://schemas.microsoft.com/office/powerpoint/2010/main" val="3459930867"/>
+      </p:ext>
+    </p:extLst>
+  </p:cSld>
+  <p:clrMapOvr>
+    <a:masterClrMapping/>
+  </p:clrMapOvr>
+</p:sld>
+</file>
+
+<file path=ppt/slides/slide12.xml><?xml version="1.0" encoding="utf-8"?>
+<p:sld xmlns:a="http://schemas.openxmlformats.org/drawingml/2006/main" xmlns:r="http://schemas.openxmlformats.org/officeDocument/2006/relationships" xmlns:p="http://schemas.openxmlformats.org/presentationml/2006/main">
+  <p:cSld>
+    <p:spTree>
+      <p:nvGrpSpPr>
+        <p:cNvPr id="1" name=""/>
+        <p:cNvGrpSpPr/>
+        <p:nvPr/>
+      </p:nvGrpSpPr>
+      <p:grpSpPr>
+        <a:xfrm>
+          <a:off x="0" y="0"/>
+          <a:ext cx="0" cy="0"/>
+          <a:chOff x="0" y="0"/>
+          <a:chExt cx="0" cy="0"/>
+        </a:xfrm>
+      </p:grpSpPr>
       <p:pic>
         <p:nvPicPr>
           <p:cNvPr id="4" name="Content Placeholder 3">
@@ -3812,7 +3972,7 @@
 </p:sld>
 </file>
 
-<file path=ppt/slides/slide12.xml><?xml version="1.0" encoding="utf-8"?>
+<file path=ppt/slides/slide13.xml><?xml version="1.0" encoding="utf-8"?>
 <p:sld xmlns:a="http://schemas.openxmlformats.org/drawingml/2006/main" xmlns:r="http://schemas.openxmlformats.org/officeDocument/2006/relationships" xmlns:p="http://schemas.openxmlformats.org/presentationml/2006/main">
   <p:cSld>
     <p:spTree>
@@ -3829,56 +3989,6 @@
           <a:chExt cx="0" cy="0"/>
         </a:xfrm>
       </p:grpSpPr>
-      <p:sp>
-        <p:nvSpPr>
-          <p:cNvPr id="2" name="Title 1">
-            <a:extLst>
-              <a:ext uri="{FF2B5EF4-FFF2-40B4-BE49-F238E27FC236}">
-                <a16:creationId xmlns:a16="http://schemas.microsoft.com/office/drawing/2014/main" id="{8509DB55-484D-41E6-9C41-C0CF82181927}"/>
-              </a:ext>
-            </a:extLst>
-          </p:cNvPr>
-          <p:cNvSpPr>
-            <a:spLocks noGrp="1"/>
-          </p:cNvSpPr>
-          <p:nvPr>
-            <p:ph type="title"/>
-          </p:nvPr>
-        </p:nvSpPr>
-        <p:spPr/>
-        <p:txBody>
-          <a:bodyPr/>
-          <a:lstStyle/>
-          <a:p>
-            <a:endParaRPr lang="en-US"/>
-          </a:p>
-        </p:txBody>
-      </p:sp>
-      <p:sp>
-        <p:nvSpPr>
-          <p:cNvPr id="3" name="Content Placeholder 2">
-            <a:extLst>
-              <a:ext uri="{FF2B5EF4-FFF2-40B4-BE49-F238E27FC236}">
-                <a16:creationId xmlns:a16="http://schemas.microsoft.com/office/drawing/2014/main" id="{B9EF35AB-C30E-41FD-8A12-9AEF47EA7780}"/>
-              </a:ext>
-            </a:extLst>
-          </p:cNvPr>
-          <p:cNvSpPr>
-            <a:spLocks noGrp="1"/>
-          </p:cNvSpPr>
-          <p:nvPr>
-            <p:ph idx="1"/>
-          </p:nvPr>
-        </p:nvSpPr>
-        <p:spPr/>
-        <p:txBody>
-          <a:bodyPr/>
-          <a:lstStyle/>
-          <a:p>
-            <a:endParaRPr lang="en-US"/>
-          </a:p>
-        </p:txBody>
-      </p:sp>
       <p:pic>
         <p:nvPicPr>
           <p:cNvPr id="4" name="Picture 3">
@@ -3921,139 +4031,6 @@
 </p:sld>
 </file>
 
-<file path=ppt/slides/slide13.xml><?xml version="1.0" encoding="utf-8"?>
-<p:sld xmlns:a="http://schemas.openxmlformats.org/drawingml/2006/main" xmlns:r="http://schemas.openxmlformats.org/officeDocument/2006/relationships" xmlns:p="http://schemas.openxmlformats.org/presentationml/2006/main">
-  <p:cSld>
-    <p:spTree>
-      <p:nvGrpSpPr>
-        <p:cNvPr id="1" name=""/>
-        <p:cNvGrpSpPr/>
-        <p:nvPr/>
-      </p:nvGrpSpPr>
-      <p:grpSpPr>
-        <a:xfrm>
-          <a:off x="0" y="0"/>
-          <a:ext cx="0" cy="0"/>
-          <a:chOff x="0" y="0"/>
-          <a:chExt cx="0" cy="0"/>
-        </a:xfrm>
-      </p:grpSpPr>
-      <p:sp>
-        <p:nvSpPr>
-          <p:cNvPr id="2" name="Title 1">
-            <a:extLst>
-              <a:ext uri="{FF2B5EF4-FFF2-40B4-BE49-F238E27FC236}">
-                <a16:creationId xmlns:a16="http://schemas.microsoft.com/office/drawing/2014/main" id="{7841F237-E851-45C1-B6F9-49952C71EAF6}"/>
-              </a:ext>
-            </a:extLst>
-          </p:cNvPr>
-          <p:cNvSpPr>
-            <a:spLocks noGrp="1"/>
-          </p:cNvSpPr>
-          <p:nvPr>
-            <p:ph type="title"/>
-          </p:nvPr>
-        </p:nvSpPr>
-        <p:spPr/>
-        <p:txBody>
-          <a:bodyPr/>
-          <a:lstStyle/>
-          <a:p>
-            <a:pPr algn="ctr"/>
-            <a:r>
-              <a:rPr lang="en-US" dirty="0"/>
-              <a:t>Data Sources</a:t>
-            </a:r>
-          </a:p>
-        </p:txBody>
-      </p:sp>
-      <p:sp>
-        <p:nvSpPr>
-          <p:cNvPr id="3" name="Content Placeholder 2">
-            <a:extLst>
-              <a:ext uri="{FF2B5EF4-FFF2-40B4-BE49-F238E27FC236}">
-                <a16:creationId xmlns:a16="http://schemas.microsoft.com/office/drawing/2014/main" id="{3B89DCDC-C721-4B04-8CE0-E8DCD8150E05}"/>
-              </a:ext>
-            </a:extLst>
-          </p:cNvPr>
-          <p:cNvSpPr>
-            <a:spLocks noGrp="1"/>
-          </p:cNvSpPr>
-          <p:nvPr>
-            <p:ph idx="1"/>
-          </p:nvPr>
-        </p:nvSpPr>
-        <p:spPr/>
-        <p:txBody>
-          <a:bodyPr/>
-          <a:lstStyle/>
-          <a:p>
-            <a:r>
-              <a:rPr lang="en-US" dirty="0">
-                <a:latin typeface="Arial" panose="020B0604020202020204" pitchFamily="34" charset="0"/>
-                <a:cs typeface="Arial" panose="020B0604020202020204" pitchFamily="34" charset="0"/>
-              </a:rPr>
-              <a:t>Covid-19 dataset.csv, COVID19 dataset (March 2020).csv and covid-19Totaldataset.</a:t>
-            </a:r>
-          </a:p>
-          <a:p>
-            <a:pPr lvl="1"/>
-            <a:r>
-              <a:rPr lang="en-US" sz="2800" dirty="0">
-                <a:latin typeface="Arial" panose="020B0604020202020204" pitchFamily="34" charset="0"/>
-                <a:cs typeface="Arial" panose="020B0604020202020204" pitchFamily="34" charset="0"/>
-              </a:rPr>
-              <a:t>Date</a:t>
-            </a:r>
-          </a:p>
-          <a:p>
-            <a:pPr lvl="1"/>
-            <a:r>
-              <a:rPr lang="en-US" sz="2800" dirty="0">
-                <a:latin typeface="Arial" panose="020B0604020202020204" pitchFamily="34" charset="0"/>
-                <a:cs typeface="Arial" panose="020B0604020202020204" pitchFamily="34" charset="0"/>
-              </a:rPr>
-              <a:t>Total confirmed cases</a:t>
-            </a:r>
-          </a:p>
-          <a:p>
-            <a:pPr lvl="1"/>
-            <a:r>
-              <a:rPr lang="en-US" sz="2800" dirty="0">
-                <a:latin typeface="Arial" panose="020B0604020202020204" pitchFamily="34" charset="0"/>
-                <a:cs typeface="Arial" panose="020B0604020202020204" pitchFamily="34" charset="0"/>
-              </a:rPr>
-              <a:t>Total death cases</a:t>
-            </a:r>
-          </a:p>
-          <a:p>
-            <a:pPr lvl="1"/>
-            <a:r>
-              <a:rPr lang="en-US" sz="2800" dirty="0">
-                <a:latin typeface="Arial" panose="020B0604020202020204" pitchFamily="34" charset="0"/>
-                <a:cs typeface="Arial" panose="020B0604020202020204" pitchFamily="34" charset="0"/>
-              </a:rPr>
-              <a:t>Total recovered cases</a:t>
-            </a:r>
-          </a:p>
-          <a:p>
-            <a:endParaRPr lang="en-US" dirty="0"/>
-          </a:p>
-        </p:txBody>
-      </p:sp>
-    </p:spTree>
-    <p:extLst>
-      <p:ext uri="{BB962C8B-B14F-4D97-AF65-F5344CB8AC3E}">
-        <p14:creationId xmlns:p14="http://schemas.microsoft.com/office/powerpoint/2010/main" val="1843278469"/>
-      </p:ext>
-    </p:extLst>
-  </p:cSld>
-  <p:clrMapOvr>
-    <a:masterClrMapping/>
-  </p:clrMapOvr>
-</p:sld>
-</file>
-
 <file path=ppt/slides/slide14.xml><?xml version="1.0" encoding="utf-8"?>
 <p:sld xmlns:a="http://schemas.openxmlformats.org/drawingml/2006/main" xmlns:r="http://schemas.openxmlformats.org/officeDocument/2006/relationships" xmlns:p="http://schemas.openxmlformats.org/presentationml/2006/main">
   <p:cSld>
@@ -4076,7 +4053,7 @@
           <p:cNvPr id="2" name="Title 1">
             <a:extLst>
               <a:ext uri="{FF2B5EF4-FFF2-40B4-BE49-F238E27FC236}">
-                <a16:creationId xmlns:a16="http://schemas.microsoft.com/office/drawing/2014/main" id="{73EF2967-DE41-481C-AF4E-D1C4E677E02A}"/>
+                <a16:creationId xmlns:a16="http://schemas.microsoft.com/office/drawing/2014/main" id="{E89D4C5B-2A97-4EEF-BE04-6CA8C40D5A2A}"/>
               </a:ext>
             </a:extLst>
           </p:cNvPr>
@@ -4094,97 +4071,84 @@
           <a:p>
             <a:pPr algn="ctr"/>
             <a:r>
+              <a:rPr lang="en-US" b="1" dirty="0"/>
+              <a:t>Gary Task</a:t>
+            </a:r>
+          </a:p>
+        </p:txBody>
+      </p:sp>
+      <p:sp>
+        <p:nvSpPr>
+          <p:cNvPr id="3" name="Content Placeholder 2">
+            <a:extLst>
+              <a:ext uri="{FF2B5EF4-FFF2-40B4-BE49-F238E27FC236}">
+                <a16:creationId xmlns:a16="http://schemas.microsoft.com/office/drawing/2014/main" id="{64EF9376-1391-4C12-8847-1F3123878504}"/>
+              </a:ext>
+            </a:extLst>
+          </p:cNvPr>
+          <p:cNvSpPr>
+            <a:spLocks noGrp="1"/>
+          </p:cNvSpPr>
+          <p:nvPr>
+            <p:ph idx="1"/>
+          </p:nvPr>
+        </p:nvSpPr>
+        <p:spPr>
+          <a:xfrm>
+            <a:off x="1219940" y="1879557"/>
+            <a:ext cx="5358413" cy="4115124"/>
+          </a:xfrm>
+        </p:spPr>
+        <p:txBody>
+          <a:bodyPr/>
+          <a:lstStyle/>
+          <a:p>
+            <a:r>
               <a:rPr lang="en-US" dirty="0"/>
-              <a:t>Implementation of Line Chart</a:t>
-            </a:r>
-          </a:p>
-        </p:txBody>
-      </p:sp>
-      <p:sp>
-        <p:nvSpPr>
-          <p:cNvPr id="3" name="Content Placeholder 2">
-            <a:extLst>
-              <a:ext uri="{FF2B5EF4-FFF2-40B4-BE49-F238E27FC236}">
-                <a16:creationId xmlns:a16="http://schemas.microsoft.com/office/drawing/2014/main" id="{EFF3CDC7-C04E-423F-9414-96627C449F96}"/>
-              </a:ext>
-            </a:extLst>
-          </p:cNvPr>
-          <p:cNvSpPr>
-            <a:spLocks noGrp="1"/>
-          </p:cNvSpPr>
-          <p:nvPr>
-            <p:ph idx="1"/>
-          </p:nvPr>
-        </p:nvSpPr>
-        <p:spPr/>
-        <p:txBody>
-          <a:bodyPr>
-            <a:normAutofit fontScale="92500"/>
-          </a:bodyPr>
-          <a:lstStyle/>
+              <a:t>Gary’s task was to created Table chart of top 15 countries of highest confirmed cases in the month of March.</a:t>
+            </a:r>
+          </a:p>
           <a:p>
             <a:r>
               <a:rPr lang="en-US" dirty="0"/>
-              <a:t>Import the D3.js library directly from the CDN inside the HTML.</a:t>
-            </a:r>
-          </a:p>
-          <a:p>
-            <a:r>
-              <a:rPr lang="en-US" dirty="0"/>
-              <a:t>Parse the date / Time</a:t>
-            </a:r>
-          </a:p>
-          <a:p>
-            <a:r>
-              <a:rPr lang="en-US" dirty="0"/>
-              <a:t>Set the range and define the line axis</a:t>
-            </a:r>
-          </a:p>
-          <a:p>
-            <a:r>
-              <a:rPr lang="en-US" dirty="0"/>
-              <a:t>Append the SVG element</a:t>
-            </a:r>
-          </a:p>
-          <a:p>
-            <a:r>
-              <a:rPr lang="en-US" dirty="0"/>
-              <a:t>Get the data and format the data accordingly</a:t>
-            </a:r>
-          </a:p>
-          <a:p>
-            <a:r>
-              <a:rPr lang="en-US" dirty="0"/>
-              <a:t>Scale the range of data</a:t>
-            </a:r>
-          </a:p>
-          <a:p>
-            <a:r>
-              <a:rPr lang="en-US" dirty="0"/>
-              <a:t>Add the value line path</a:t>
-            </a:r>
-          </a:p>
-          <a:p>
-            <a:r>
-              <a:rPr lang="en-US" dirty="0"/>
-              <a:t>Add the X-axis and Y-axis</a:t>
-            </a:r>
-          </a:p>
-          <a:p>
-            <a:r>
-              <a:rPr lang="en-US" dirty="0"/>
-              <a:t>Additional: Create the dots with tooltips as well as the title of the charts</a:t>
-            </a:r>
-          </a:p>
-          <a:p>
-            <a:endParaRPr lang="en-US" dirty="0"/>
-          </a:p>
-        </p:txBody>
-      </p:sp>
+              <a:t>Implementation using D3 and used Covid-top15 dataset to list top 15 countries. </a:t>
+            </a:r>
+          </a:p>
+        </p:txBody>
+      </p:sp>
+      <p:pic>
+        <p:nvPicPr>
+          <p:cNvPr id="4" name="Picture 3">
+            <a:extLst>
+              <a:ext uri="{FF2B5EF4-FFF2-40B4-BE49-F238E27FC236}">
+                <a16:creationId xmlns:a16="http://schemas.microsoft.com/office/drawing/2014/main" id="{2E5079D8-2C33-4441-90D4-18DB08D89D72}"/>
+              </a:ext>
+            </a:extLst>
+          </p:cNvPr>
+          <p:cNvPicPr>
+            <a:picLocks noChangeAspect="1"/>
+          </p:cNvPicPr>
+          <p:nvPr/>
+        </p:nvPicPr>
+        <p:blipFill rotWithShape="1">
+          <a:blip r:embed="rId2"/>
+          <a:srcRect l="63641" t="22395" r="13204" b="21165"/>
+          <a:stretch/>
+        </p:blipFill>
+        <p:spPr>
+          <a:xfrm>
+            <a:off x="7933419" y="1413164"/>
+            <a:ext cx="3573772" cy="4931487"/>
+          </a:xfrm>
+          <a:prstGeom prst="rect">
+            <a:avLst/>
+          </a:prstGeom>
+        </p:spPr>
+      </p:pic>
     </p:spTree>
     <p:extLst>
       <p:ext uri="{BB962C8B-B14F-4D97-AF65-F5344CB8AC3E}">
-        <p14:creationId xmlns:p14="http://schemas.microsoft.com/office/powerpoint/2010/main" val="2834004490"/>
+        <p14:creationId xmlns:p14="http://schemas.microsoft.com/office/powerpoint/2010/main" val="1450782287"/>
       </p:ext>
     </p:extLst>
   </p:cSld>
@@ -4216,7 +4180,7 @@
           <p:cNvPr id="2" name="Title 1">
             <a:extLst>
               <a:ext uri="{FF2B5EF4-FFF2-40B4-BE49-F238E27FC236}">
-                <a16:creationId xmlns:a16="http://schemas.microsoft.com/office/drawing/2014/main" id="{E89D4C5B-2A97-4EEF-BE04-6CA8C40D5A2A}"/>
+                <a16:creationId xmlns:a16="http://schemas.microsoft.com/office/drawing/2014/main" id="{75B940B9-A0D9-4A56-8B88-CF8EF23BED72}"/>
               </a:ext>
             </a:extLst>
           </p:cNvPr>
@@ -4234,74 +4198,30 @@
           <a:p>
             <a:pPr algn="ctr"/>
             <a:r>
-              <a:rPr lang="en-US" dirty="0"/>
-              <a:t>Gary Task</a:t>
-            </a:r>
-          </a:p>
-        </p:txBody>
-      </p:sp>
-      <p:sp>
-        <p:nvSpPr>
-          <p:cNvPr id="3" name="Content Placeholder 2">
-            <a:extLst>
-              <a:ext uri="{FF2B5EF4-FFF2-40B4-BE49-F238E27FC236}">
-                <a16:creationId xmlns:a16="http://schemas.microsoft.com/office/drawing/2014/main" id="{64EF9376-1391-4C12-8847-1F3123878504}"/>
-              </a:ext>
-            </a:extLst>
-          </p:cNvPr>
-          <p:cNvSpPr>
-            <a:spLocks noGrp="1"/>
-          </p:cNvSpPr>
-          <p:nvPr>
-            <p:ph idx="1"/>
-          </p:nvPr>
-        </p:nvSpPr>
-        <p:spPr>
-          <a:xfrm>
-            <a:off x="1219940" y="1879557"/>
-            <a:ext cx="5358413" cy="4115124"/>
-          </a:xfrm>
-        </p:spPr>
-        <p:txBody>
-          <a:bodyPr/>
-          <a:lstStyle/>
-          <a:p>
-            <a:r>
-              <a:rPr lang="en-US" dirty="0"/>
-              <a:t>Gary’s task was to created Table chart of top 15 countries of highest confirmed cases in the month of March.</a:t>
-            </a:r>
-          </a:p>
-          <a:p>
-            <a:r>
-              <a:rPr lang="en-US" dirty="0"/>
-              <a:t>Implementation using D3 and used Covid-top15 dataset to list top 15 countries. </a:t>
+              <a:rPr lang="en-US" b="1" dirty="0"/>
+              <a:t>Dashboard </a:t>
             </a:r>
           </a:p>
         </p:txBody>
       </p:sp>
       <p:pic>
         <p:nvPicPr>
-          <p:cNvPr id="4" name="Picture 3">
-            <a:extLst>
-              <a:ext uri="{FF2B5EF4-FFF2-40B4-BE49-F238E27FC236}">
-                <a16:creationId xmlns:a16="http://schemas.microsoft.com/office/drawing/2014/main" id="{2E5079D8-2C33-4441-90D4-18DB08D89D72}"/>
-              </a:ext>
-            </a:extLst>
-          </p:cNvPr>
+          <p:cNvPr id="5" name="Picture 4"/>
           <p:cNvPicPr>
             <a:picLocks noChangeAspect="1"/>
           </p:cNvPicPr>
           <p:nvPr/>
         </p:nvPicPr>
-        <p:blipFill rotWithShape="1">
+        <p:blipFill>
           <a:blip r:embed="rId2"/>
-          <a:srcRect l="63641" t="22395" r="13204" b="21165"/>
-          <a:stretch/>
+          <a:stretch>
+            <a:fillRect/>
+          </a:stretch>
         </p:blipFill>
         <p:spPr>
           <a:xfrm>
-            <a:off x="8148960" y="1553337"/>
-            <a:ext cx="2823100" cy="4767564"/>
+            <a:off x="570016" y="2250055"/>
+            <a:ext cx="11360973" cy="2433709"/>
           </a:xfrm>
           <a:prstGeom prst="rect">
             <a:avLst/>
@@ -4311,7 +4231,7 @@
     </p:spTree>
     <p:extLst>
       <p:ext uri="{BB962C8B-B14F-4D97-AF65-F5344CB8AC3E}">
-        <p14:creationId xmlns:p14="http://schemas.microsoft.com/office/powerpoint/2010/main" val="1450782287"/>
+        <p14:creationId xmlns:p14="http://schemas.microsoft.com/office/powerpoint/2010/main" val="2131166879"/>
       </p:ext>
     </p:extLst>
   </p:cSld>
@@ -4361,98 +4281,12 @@
           <a:p>
             <a:pPr algn="ctr"/>
             <a:r>
+              <a:rPr lang="en-US" b="1" dirty="0"/>
+              <a:t>Dashboard</a:t>
+            </a:r>
+            <a:r>
               <a:rPr lang="en-US" dirty="0"/>
-              <a:t>Dashboard </a:t>
-            </a:r>
-          </a:p>
-        </p:txBody>
-      </p:sp>
-      <p:pic>
-        <p:nvPicPr>
-          <p:cNvPr id="4" name="Content Placeholder 3">
-            <a:extLst>
-              <a:ext uri="{FF2B5EF4-FFF2-40B4-BE49-F238E27FC236}">
-                <a16:creationId xmlns:a16="http://schemas.microsoft.com/office/drawing/2014/main" id="{362FAE0B-ADD7-4288-BDA1-8A6CD4EA6E07}"/>
-              </a:ext>
-            </a:extLst>
-          </p:cNvPr>
-          <p:cNvPicPr>
-            <a:picLocks noGrp="1" noChangeAspect="1"/>
-          </p:cNvPicPr>
-          <p:nvPr>
-            <p:ph idx="1"/>
-          </p:nvPr>
-        </p:nvPicPr>
-        <p:blipFill rotWithShape="1">
-          <a:blip r:embed="rId2"/>
-          <a:srcRect l="-1" t="8392" r="1611" b="8865"/>
-          <a:stretch/>
-        </p:blipFill>
-        <p:spPr>
-          <a:xfrm>
-            <a:off x="1037519" y="1466849"/>
-            <a:ext cx="9644856" cy="4562476"/>
-          </a:xfrm>
-          <a:prstGeom prst="rect">
-            <a:avLst/>
-          </a:prstGeom>
-        </p:spPr>
-      </p:pic>
-    </p:spTree>
-    <p:extLst>
-      <p:ext uri="{BB962C8B-B14F-4D97-AF65-F5344CB8AC3E}">
-        <p14:creationId xmlns:p14="http://schemas.microsoft.com/office/powerpoint/2010/main" val="2131166879"/>
-      </p:ext>
-    </p:extLst>
-  </p:cSld>
-  <p:clrMapOvr>
-    <a:masterClrMapping/>
-  </p:clrMapOvr>
-</p:sld>
-</file>
-
-<file path=ppt/slides/slide17.xml><?xml version="1.0" encoding="utf-8"?>
-<p:sld xmlns:a="http://schemas.openxmlformats.org/drawingml/2006/main" xmlns:r="http://schemas.openxmlformats.org/officeDocument/2006/relationships" xmlns:p="http://schemas.openxmlformats.org/presentationml/2006/main">
-  <p:cSld>
-    <p:spTree>
-      <p:nvGrpSpPr>
-        <p:cNvPr id="1" name=""/>
-        <p:cNvGrpSpPr/>
-        <p:nvPr/>
-      </p:nvGrpSpPr>
-      <p:grpSpPr>
-        <a:xfrm>
-          <a:off x="0" y="0"/>
-          <a:ext cx="0" cy="0"/>
-          <a:chOff x="0" y="0"/>
-          <a:chExt cx="0" cy="0"/>
-        </a:xfrm>
-      </p:grpSpPr>
-      <p:sp>
-        <p:nvSpPr>
-          <p:cNvPr id="2" name="Title 1">
-            <a:extLst>
-              <a:ext uri="{FF2B5EF4-FFF2-40B4-BE49-F238E27FC236}">
-                <a16:creationId xmlns:a16="http://schemas.microsoft.com/office/drawing/2014/main" id="{75B940B9-A0D9-4A56-8B88-CF8EF23BED72}"/>
-              </a:ext>
-            </a:extLst>
-          </p:cNvPr>
-          <p:cNvSpPr>
-            <a:spLocks noGrp="1"/>
-          </p:cNvSpPr>
-          <p:nvPr>
-            <p:ph type="title"/>
-          </p:nvPr>
-        </p:nvSpPr>
-        <p:spPr/>
-        <p:txBody>
-          <a:bodyPr/>
-          <a:lstStyle/>
-          <a:p>
-            <a:pPr algn="ctr"/>
-            <a:r>
-              <a:rPr lang="en-US" dirty="0"/>
-              <a:t>Dashboard </a:t>
+              <a:t> </a:t>
             </a:r>
           </a:p>
         </p:txBody>
@@ -4501,7 +4335,7 @@
 </p:sld>
 </file>
 
-<file path=ppt/slides/slide18.xml><?xml version="1.0" encoding="utf-8"?>
+<file path=ppt/slides/slide17.xml><?xml version="1.0" encoding="utf-8"?>
 <p:sld xmlns:a="http://schemas.openxmlformats.org/drawingml/2006/main" xmlns:r="http://schemas.openxmlformats.org/officeDocument/2006/relationships" xmlns:p="http://schemas.openxmlformats.org/presentationml/2006/main">
   <p:cSld>
     <p:spTree>
@@ -4541,8 +4375,12 @@
           <a:p>
             <a:pPr algn="ctr"/>
             <a:r>
+              <a:rPr lang="en-US" b="1" dirty="0"/>
+              <a:t>Dashboard</a:t>
+            </a:r>
+            <a:r>
               <a:rPr lang="en-US" dirty="0"/>
-              <a:t>Dashboard </a:t>
+              <a:t> </a:t>
             </a:r>
           </a:p>
         </p:txBody>
@@ -4591,7 +4429,7 @@
 </p:sld>
 </file>
 
-<file path=ppt/slides/slide19.xml><?xml version="1.0" encoding="utf-8"?>
+<file path=ppt/slides/slide18.xml><?xml version="1.0" encoding="utf-8"?>
 <p:sld xmlns:a="http://schemas.openxmlformats.org/drawingml/2006/main" xmlns:r="http://schemas.openxmlformats.org/officeDocument/2006/relationships" xmlns:p="http://schemas.openxmlformats.org/presentationml/2006/main">
   <p:cSld>
     <p:spTree>
@@ -4636,7 +4474,7 @@
           <a:p>
             <a:pPr algn="ctr"/>
             <a:r>
-              <a:rPr lang="en-US" dirty="0"/>
+              <a:rPr lang="en-US" b="1" dirty="0"/>
               <a:t>GitHub Link</a:t>
             </a:r>
           </a:p>
@@ -4740,8 +4578,12 @@
           <a:p>
             <a:pPr algn="ctr"/>
             <a:r>
+              <a:rPr lang="en-US" b="1" dirty="0"/>
+              <a:t>Outline</a:t>
+            </a:r>
+            <a:r>
               <a:rPr lang="en-US" dirty="0"/>
-              <a:t>Outline </a:t>
+              <a:t> </a:t>
             </a:r>
           </a:p>
         </p:txBody>
@@ -4896,7 +4738,7 @@
           <a:p>
             <a:pPr algn="ctr"/>
             <a:r>
-              <a:rPr lang="en-US" dirty="0"/>
+              <a:rPr lang="en-US" b="1" dirty="0"/>
               <a:t>Purpose of Dashboard</a:t>
             </a:r>
           </a:p>
@@ -4933,8 +4775,28 @@
           </a:p>
           <a:p>
             <a:r>
+              <a:rPr lang="en-US" dirty="0" smtClean="0"/>
+              <a:t>Covid</a:t>
+            </a:r>
+            <a:r>
+              <a:rPr lang="en-US" dirty="0" smtClean="0"/>
+              <a:t>-19 </a:t>
+            </a:r>
+            <a:r>
+              <a:rPr lang="en-US" dirty="0" smtClean="0"/>
+              <a:t>Confirmed, deaths and recovered cases </a:t>
+            </a:r>
+            <a:r>
               <a:rPr lang="en-US" dirty="0"/>
-              <a:t>Confirm cases, deaths globally with daily statistics.</a:t>
+              <a:t>globally with </a:t>
+            </a:r>
+            <a:r>
+              <a:rPr lang="en-US" dirty="0" smtClean="0"/>
+              <a:t>provided graphical </a:t>
+            </a:r>
+            <a:r>
+              <a:rPr lang="en-US" dirty="0"/>
+              <a:t>statistics.</a:t>
             </a:r>
           </a:p>
           <a:p>
@@ -4952,8 +4814,13 @@
           <a:p>
             <a:r>
               <a:rPr lang="en-US" dirty="0"/>
-              <a:t>Help user to see correlations and relationships that can provide insights into COVID-19 and how communities responding to it.</a:t>
-            </a:r>
+              <a:t>Help user to see correlations and relationships that can provide insights into COVID-19 and how communities responding to </a:t>
+            </a:r>
+            <a:r>
+              <a:rPr lang="en-US" dirty="0" smtClean="0"/>
+              <a:t>it</a:t>
+            </a:r>
+            <a:endParaRPr lang="en-US" dirty="0"/>
           </a:p>
         </p:txBody>
       </p:sp>
@@ -5010,7 +4877,7 @@
           <a:p>
             <a:pPr algn="ctr"/>
             <a:r>
-              <a:rPr lang="en-US" dirty="0"/>
+              <a:rPr lang="en-US" b="1" dirty="0"/>
               <a:t>Introduction</a:t>
             </a:r>
           </a:p>
@@ -5051,14 +4918,24 @@
           <a:p>
             <a:r>
               <a:rPr lang="en-US" dirty="0"/>
-              <a:t>The Dashboard focus on the month of March.</a:t>
-            </a:r>
+              <a:t>The Dashboard focus on the month of </a:t>
+            </a:r>
+            <a:r>
+              <a:rPr lang="en-US" dirty="0" smtClean="0"/>
+              <a:t>March</a:t>
+            </a:r>
+            <a:endParaRPr lang="en-US" dirty="0"/>
           </a:p>
           <a:p>
             <a:r>
               <a:rPr lang="en-US" dirty="0"/>
-              <a:t>The Dashboard is compile from individual tasks. </a:t>
-            </a:r>
+              <a:t>The Dashboard is compile from individual </a:t>
+            </a:r>
+            <a:r>
+              <a:rPr lang="en-US" dirty="0" smtClean="0"/>
+              <a:t>tasks</a:t>
+            </a:r>
+            <a:endParaRPr lang="en-US" dirty="0"/>
           </a:p>
         </p:txBody>
       </p:sp>
@@ -5115,8 +4992,8 @@
           <a:p>
             <a:pPr algn="ctr"/>
             <a:r>
-              <a:rPr lang="en-US" dirty="0"/>
-              <a:t>Who done the task?</a:t>
+              <a:rPr lang="en-US" b="1" dirty="0"/>
+              <a:t>Software &amp; Language Used</a:t>
             </a:r>
           </a:p>
         </p:txBody>
@@ -5139,62 +5016,91 @@
         </p:nvSpPr>
         <p:spPr/>
         <p:txBody>
-          <a:bodyPr/>
-          <a:lstStyle/>
-          <a:p>
-            <a:pPr marL="0" indent="0">
+          <a:bodyPr>
+            <a:normAutofit/>
+          </a:bodyPr>
+          <a:lstStyle/>
+          <a:p>
+            <a:pPr algn="just">
               <a:lnSpc>
                 <a:spcPct val="100000"/>
               </a:lnSpc>
-              <a:buNone/>
+              <a:buFont typeface="Wingdings" panose="05000000000000000000" pitchFamily="2" charset="2"/>
+              <a:buChar char="§"/>
             </a:pPr>
             <a:r>
-              <a:rPr lang="en-US" dirty="0"/>
-              <a:t>1. </a:t>
-            </a:r>
-            <a:r>
-              <a:rPr lang="en-US" dirty="0" err="1"/>
-              <a:t>Haziq</a:t>
-            </a:r>
-            <a:r>
-              <a:rPr lang="en-US" dirty="0"/>
-              <a:t> – created the interactive map to show individual country with information of confirm cases, death and recovery statistics. </a:t>
-            </a:r>
-          </a:p>
-          <a:p>
-            <a:pPr marL="0" indent="0">
+              <a:rPr lang="en-US" sz="2400" dirty="0"/>
+              <a:t>Notepad++</a:t>
+            </a:r>
+          </a:p>
+          <a:p>
+            <a:pPr algn="just">
               <a:lnSpc>
                 <a:spcPct val="100000"/>
               </a:lnSpc>
-              <a:buNone/>
+              <a:buFont typeface="Wingdings" panose="05000000000000000000" pitchFamily="2" charset="2"/>
+              <a:buChar char="§"/>
             </a:pPr>
             <a:r>
-              <a:rPr lang="en-US" dirty="0"/>
-              <a:t>2. Amal – created the total line graph of total confirmed cases, total deaths and total recovery.</a:t>
-            </a:r>
-          </a:p>
-          <a:p>
-            <a:pPr marL="0" indent="0">
+              <a:rPr lang="en-US" sz="2400" dirty="0" err="1"/>
+              <a:t>XAMPP</a:t>
+            </a:r>
+            <a:endParaRPr lang="en-US" sz="2400" dirty="0"/>
+          </a:p>
+          <a:p>
+            <a:pPr algn="just">
               <a:lnSpc>
-                <a:spcPct val="150000"/>
+                <a:spcPct val="100000"/>
               </a:lnSpc>
-              <a:buNone/>
+              <a:buFont typeface="Wingdings" panose="05000000000000000000" pitchFamily="2" charset="2"/>
+              <a:buChar char="§"/>
             </a:pPr>
             <a:r>
-              <a:rPr lang="en-US" dirty="0"/>
-              <a:t>3. Marni – created COVID-19 Radial Scale Chart and Summary Tiles</a:t>
-            </a:r>
-          </a:p>
-          <a:p>
-            <a:pPr marL="0" indent="0">
+              <a:rPr lang="en-US" sz="2400" dirty="0"/>
+              <a:t>GitHub</a:t>
+            </a:r>
+          </a:p>
+          <a:p>
+            <a:pPr algn="just">
               <a:lnSpc>
-                <a:spcPct val="150000"/>
+                <a:spcPct val="100000"/>
               </a:lnSpc>
-              <a:buNone/>
+              <a:buFont typeface="Wingdings" panose="05000000000000000000" pitchFamily="2" charset="2"/>
+              <a:buChar char="§"/>
             </a:pPr>
             <a:r>
-              <a:rPr lang="en-US" dirty="0"/>
-              <a:t>4. Gary – created table of top 15 countries with confirm cases.</a:t>
+              <a:rPr lang="en-US" sz="2400" dirty="0" err="1"/>
+              <a:t>D3</a:t>
+            </a:r>
+            <a:r>
+              <a:rPr lang="en-US" sz="2400" dirty="0"/>
+              <a:t> – JavaScript library </a:t>
+            </a:r>
+          </a:p>
+          <a:p>
+            <a:pPr algn="just">
+              <a:lnSpc>
+                <a:spcPct val="100000"/>
+              </a:lnSpc>
+              <a:buFont typeface="Wingdings" panose="05000000000000000000" pitchFamily="2" charset="2"/>
+              <a:buChar char="§"/>
+            </a:pPr>
+            <a:r>
+              <a:rPr lang="en-US" sz="2400" dirty="0"/>
+              <a:t>Visualization data – HTML, SVG &amp; CSS</a:t>
+            </a:r>
+          </a:p>
+          <a:p>
+            <a:pPr algn="just">
+              <a:lnSpc>
+                <a:spcPct val="100000"/>
+              </a:lnSpc>
+              <a:buFont typeface="Wingdings" panose="05000000000000000000" pitchFamily="2" charset="2"/>
+              <a:buChar char="§"/>
+            </a:pPr>
+            <a:r>
+              <a:rPr lang="en-US" sz="2400" dirty="0"/>
+              <a:t>Visual Studio Code</a:t>
             </a:r>
           </a:p>
         </p:txBody>
@@ -5202,7 +5108,7 @@
     </p:spTree>
     <p:extLst>
       <p:ext uri="{BB962C8B-B14F-4D97-AF65-F5344CB8AC3E}">
-        <p14:creationId xmlns:p14="http://schemas.microsoft.com/office/powerpoint/2010/main" val="1861799579"/>
+        <p14:creationId xmlns:p14="http://schemas.microsoft.com/office/powerpoint/2010/main" val="4096234240"/>
       </p:ext>
     </p:extLst>
   </p:cSld>
@@ -5234,7 +5140,7 @@
           <p:cNvPr id="2" name="Title 1">
             <a:extLst>
               <a:ext uri="{FF2B5EF4-FFF2-40B4-BE49-F238E27FC236}">
-                <a16:creationId xmlns:a16="http://schemas.microsoft.com/office/drawing/2014/main" id="{BAC5E497-7453-47BD-AC51-59488DB3C297}"/>
+                <a16:creationId xmlns:a16="http://schemas.microsoft.com/office/drawing/2014/main" id="{6BA9C522-8E45-4F1F-953E-D3D32EAB3569}"/>
               </a:ext>
             </a:extLst>
           </p:cNvPr>
@@ -5252,85 +5158,114 @@
           <a:p>
             <a:pPr algn="ctr"/>
             <a:r>
+              <a:rPr lang="en-US" b="1" dirty="0" smtClean="0"/>
+              <a:t>Task distribution</a:t>
+            </a:r>
+            <a:endParaRPr lang="en-US" b="1" dirty="0"/>
+          </a:p>
+        </p:txBody>
+      </p:sp>
+      <p:sp>
+        <p:nvSpPr>
+          <p:cNvPr id="3" name="Content Placeholder 2">
+            <a:extLst>
+              <a:ext uri="{FF2B5EF4-FFF2-40B4-BE49-F238E27FC236}">
+                <a16:creationId xmlns:a16="http://schemas.microsoft.com/office/drawing/2014/main" id="{3749D6E7-2907-4711-A8BD-FA553D425853}"/>
+              </a:ext>
+            </a:extLst>
+          </p:cNvPr>
+          <p:cNvSpPr>
+            <a:spLocks noGrp="1"/>
+          </p:cNvSpPr>
+          <p:nvPr>
+            <p:ph idx="1"/>
+          </p:nvPr>
+        </p:nvSpPr>
+        <p:spPr/>
+        <p:txBody>
+          <a:bodyPr/>
+          <a:lstStyle/>
+          <a:p>
+            <a:pPr marL="0" indent="0">
+              <a:lnSpc>
+                <a:spcPct val="100000"/>
+              </a:lnSpc>
+              <a:buNone/>
+            </a:pPr>
+            <a:r>
               <a:rPr lang="en-US" dirty="0"/>
-              <a:t>Dataset Preparation</a:t>
-            </a:r>
-          </a:p>
-        </p:txBody>
-      </p:sp>
-      <p:sp>
-        <p:nvSpPr>
-          <p:cNvPr id="3" name="Content Placeholder 2">
-            <a:extLst>
-              <a:ext uri="{FF2B5EF4-FFF2-40B4-BE49-F238E27FC236}">
-                <a16:creationId xmlns:a16="http://schemas.microsoft.com/office/drawing/2014/main" id="{F99B4216-6FBA-4049-8AAB-7CE40ED4876B}"/>
-              </a:ext>
-            </a:extLst>
-          </p:cNvPr>
-          <p:cNvSpPr>
-            <a:spLocks noGrp="1"/>
-          </p:cNvSpPr>
-          <p:nvPr>
-            <p:ph idx="1"/>
-          </p:nvPr>
-        </p:nvSpPr>
-        <p:spPr>
-          <a:xfrm>
-            <a:off x="838200" y="1470518"/>
-            <a:ext cx="10515600" cy="4351338"/>
-          </a:xfrm>
-        </p:spPr>
-        <p:txBody>
-          <a:bodyPr/>
-          <a:lstStyle/>
-          <a:p>
+              <a:t>1. </a:t>
+            </a:r>
+            <a:r>
+              <a:rPr lang="en-US" dirty="0" err="1"/>
+              <a:t>Haziq</a:t>
+            </a:r>
             <a:r>
               <a:rPr lang="en-US" dirty="0"/>
-              <a:t>The data was obtained from Kaggle of up-to-date of COVID-19. </a:t>
-            </a:r>
-          </a:p>
-          <a:p>
+              <a:t> – created the interactive map to show individual country with information of confirm cases, death and recovery </a:t>
+            </a:r>
+            <a:r>
+              <a:rPr lang="en-US" dirty="0" smtClean="0"/>
+              <a:t>statistics </a:t>
+            </a:r>
+            <a:endParaRPr lang="en-US" dirty="0"/>
+          </a:p>
+          <a:p>
+            <a:pPr marL="0" indent="0">
+              <a:lnSpc>
+                <a:spcPct val="100000"/>
+              </a:lnSpc>
+              <a:buNone/>
+            </a:pPr>
             <a:r>
               <a:rPr lang="en-US" dirty="0"/>
-              <a:t>The first dataset contain the information from January until April.</a:t>
-            </a:r>
-          </a:p>
-          <a:p>
+              <a:t>2. Amal – created the total line graph of total confirmed cases, total deaths and total </a:t>
+            </a:r>
+            <a:r>
+              <a:rPr lang="en-US" dirty="0" smtClean="0"/>
+              <a:t>recovery</a:t>
+            </a:r>
+            <a:endParaRPr lang="en-US" dirty="0"/>
+          </a:p>
+          <a:p>
+            <a:pPr marL="0" indent="0">
+              <a:lnSpc>
+                <a:spcPct val="100000"/>
+              </a:lnSpc>
+              <a:buNone/>
+            </a:pPr>
+            <a:r>
+              <a:rPr lang="en-US" dirty="0" smtClean="0"/>
+              <a:t>3</a:t>
+            </a:r>
             <a:r>
               <a:rPr lang="en-US" dirty="0"/>
-              <a:t>The dataset obtained was extracted into three datasets namely Covid-19 dataset (March), covid-19top15 and covid-19 total datasets.</a:t>
-            </a:r>
-          </a:p>
-          <a:p>
+              <a:t>. Marni – created COVID-19 Radial Scale Chart and Summary Tiles</a:t>
+            </a:r>
+          </a:p>
+          <a:p>
+            <a:pPr marL="0" indent="0">
+              <a:lnSpc>
+                <a:spcPct val="150000"/>
+              </a:lnSpc>
+              <a:buNone/>
+            </a:pPr>
             <a:r>
               <a:rPr lang="en-US" dirty="0"/>
-              <a:t>The Covid-19 March dataset narrow the information of single month.</a:t>
-            </a:r>
-          </a:p>
-          <a:p>
-            <a:r>
-              <a:rPr lang="en-US" dirty="0"/>
-              <a:t>The Covid-19top15 dataset contains the top 15 countries with most confirm cases of Covid-19.</a:t>
-            </a:r>
-          </a:p>
-          <a:p>
-            <a:r>
-              <a:rPr lang="en-US" dirty="0"/>
-              <a:t>Lastly, Covid-19 total contains the information of end of March.</a:t>
-            </a:r>
-          </a:p>
-          <a:p>
-            <a:r>
-              <a:rPr lang="en-US" dirty="0"/>
-              <a:t>World-110m.json was added as well.</a:t>
-            </a:r>
+              <a:t>4. Gary – created table of top 15 countries with confirm </a:t>
+            </a:r>
+            <a:r>
+              <a:rPr lang="en-US" dirty="0" smtClean="0"/>
+              <a:t>cases</a:t>
+            </a:r>
+            <a:endParaRPr lang="en-US" dirty="0"/>
           </a:p>
         </p:txBody>
       </p:sp>
     </p:spTree>
     <p:extLst>
       <p:ext uri="{BB962C8B-B14F-4D97-AF65-F5344CB8AC3E}">
-        <p14:creationId xmlns:p14="http://schemas.microsoft.com/office/powerpoint/2010/main" val="3359823348"/>
+        <p14:creationId xmlns:p14="http://schemas.microsoft.com/office/powerpoint/2010/main" val="1861799579"/>
       </p:ext>
     </p:extLst>
   </p:cSld>
@@ -5362,7 +5297,7 @@
           <p:cNvPr id="2" name="Title 1">
             <a:extLst>
               <a:ext uri="{FF2B5EF4-FFF2-40B4-BE49-F238E27FC236}">
-                <a16:creationId xmlns:a16="http://schemas.microsoft.com/office/drawing/2014/main" id="{F373B849-A11A-4FA7-8A22-C670B1D20163}"/>
+                <a16:creationId xmlns:a16="http://schemas.microsoft.com/office/drawing/2014/main" id="{BAC5E497-7453-47BD-AC51-59488DB3C297}"/>
               </a:ext>
             </a:extLst>
           </p:cNvPr>
@@ -5380,8 +5315,8 @@
           <a:p>
             <a:pPr algn="ctr"/>
             <a:r>
-              <a:rPr lang="en-US" dirty="0"/>
-              <a:t>Marni Tasks</a:t>
+              <a:rPr lang="en-US" b="1" dirty="0"/>
+              <a:t>Dataset Preparation</a:t>
             </a:r>
           </a:p>
         </p:txBody>
@@ -5391,7 +5326,7 @@
           <p:cNvPr id="3" name="Content Placeholder 2">
             <a:extLst>
               <a:ext uri="{FF2B5EF4-FFF2-40B4-BE49-F238E27FC236}">
-                <a16:creationId xmlns:a16="http://schemas.microsoft.com/office/drawing/2014/main" id="{260DD9DF-5B04-48C4-AD27-3D7015D506FB}"/>
+                <a16:creationId xmlns:a16="http://schemas.microsoft.com/office/drawing/2014/main" id="{F99B4216-6FBA-4049-8AAB-7CE40ED4876B}"/>
               </a:ext>
             </a:extLst>
           </p:cNvPr>
@@ -5404,71 +5339,74 @@
         </p:nvSpPr>
         <p:spPr>
           <a:xfrm>
-            <a:off x="838200" y="3429000"/>
-            <a:ext cx="10515600" cy="2070184"/>
+            <a:off x="838200" y="1470518"/>
+            <a:ext cx="10515600" cy="4351338"/>
           </a:xfrm>
         </p:spPr>
         <p:txBody>
-          <a:bodyPr>
-            <a:normAutofit lnSpcReduction="10000"/>
-          </a:bodyPr>
+          <a:bodyPr/>
           <a:lstStyle/>
           <a:p>
             <a:r>
               <a:rPr lang="en-US" dirty="0"/>
-              <a:t>to compile all the total statistics of confirmed, death and recovered cases in Summary Tiles.</a:t>
+              <a:t>The data was obtained from Kaggle of up-to-date of COVID-19. </a:t>
             </a:r>
           </a:p>
           <a:p>
             <a:r>
               <a:rPr lang="en-US" dirty="0"/>
-              <a:t>A summary tile can be a powerful way to put attention to one, or several important statistics such as number of Confirm case. </a:t>
+              <a:t>The first dataset contain the information from January until April.</a:t>
             </a:r>
           </a:p>
           <a:p>
             <a:r>
               <a:rPr lang="en-US" dirty="0"/>
-              <a:t>This can help to set tone for the rest of the Dashboard.</a:t>
-            </a:r>
-          </a:p>
-          <a:p>
+              <a:t>The dataset obtained was extracted into three datasets namely Covid-19 dataset (March), covid-19top15 and covid-19 total datasets.</a:t>
+            </a:r>
+          </a:p>
+          <a:p>
+            <a:r>
+              <a:rPr lang="en-US" dirty="0"/>
+              <a:t>The Covid-19 March dataset narrow the information of single month.</a:t>
+            </a:r>
+          </a:p>
+          <a:p>
+            <a:r>
+              <a:rPr lang="en-US" dirty="0"/>
+              <a:t>The Covid-19top15 dataset contains the top 15 countries with most confirm cases of Covid-19.</a:t>
+            </a:r>
+          </a:p>
+          <a:p>
+            <a:r>
+              <a:rPr lang="en-US" dirty="0"/>
+              <a:t>Lastly, Covid-19 total contains the information </a:t>
+            </a:r>
+            <a:r>
+              <a:rPr lang="en-US" dirty="0" smtClean="0"/>
+              <a:t>per weekly</a:t>
+            </a:r>
+          </a:p>
+          <a:p>
+            <a:r>
+              <a:rPr lang="en-US" dirty="0" smtClean="0"/>
+              <a:t>World-110m.json </a:t>
+            </a:r>
+            <a:r>
+              <a:rPr lang="en-US" dirty="0"/>
+              <a:t>was added as </a:t>
+            </a:r>
+            <a:r>
+              <a:rPr lang="en-US" dirty="0" smtClean="0"/>
+              <a:t>well for d3 map </a:t>
+            </a:r>
             <a:endParaRPr lang="en-US" dirty="0"/>
           </a:p>
         </p:txBody>
       </p:sp>
-      <p:pic>
-        <p:nvPicPr>
-          <p:cNvPr id="4" name="Content Placeholder 3">
-            <a:extLst>
-              <a:ext uri="{FF2B5EF4-FFF2-40B4-BE49-F238E27FC236}">
-                <a16:creationId xmlns:a16="http://schemas.microsoft.com/office/drawing/2014/main" id="{0A5DB94C-A0FF-488D-BD07-3B873E38FF4D}"/>
-              </a:ext>
-            </a:extLst>
-          </p:cNvPr>
-          <p:cNvPicPr>
-            <a:picLocks noChangeAspect="1"/>
-          </p:cNvPicPr>
-          <p:nvPr/>
-        </p:nvPicPr>
-        <p:blipFill rotWithShape="1">
-          <a:blip r:embed="rId2"/>
-          <a:srcRect t="13946" r="1188" b="59939"/>
-          <a:stretch/>
-        </p:blipFill>
-        <p:spPr>
-          <a:xfrm>
-            <a:off x="2274087" y="1923522"/>
-            <a:ext cx="7643825" cy="1136342"/>
-          </a:xfrm>
-          <a:prstGeom prst="rect">
-            <a:avLst/>
-          </a:prstGeom>
-        </p:spPr>
-      </p:pic>
     </p:spTree>
     <p:extLst>
       <p:ext uri="{BB962C8B-B14F-4D97-AF65-F5344CB8AC3E}">
-        <p14:creationId xmlns:p14="http://schemas.microsoft.com/office/powerpoint/2010/main" val="829678602"/>
+        <p14:creationId xmlns:p14="http://schemas.microsoft.com/office/powerpoint/2010/main" val="3359823348"/>
       </p:ext>
     </p:extLst>
   </p:cSld>
@@ -5500,7 +5438,7 @@
           <p:cNvPr id="2" name="Title 1">
             <a:extLst>
               <a:ext uri="{FF2B5EF4-FFF2-40B4-BE49-F238E27FC236}">
-                <a16:creationId xmlns:a16="http://schemas.microsoft.com/office/drawing/2014/main" id="{FCB00F2D-15A5-4530-85B3-86A3D8BDB9E5}"/>
+                <a16:creationId xmlns:a16="http://schemas.microsoft.com/office/drawing/2014/main" id="{F373B849-A11A-4FA7-8A22-C670B1D20163}"/>
               </a:ext>
             </a:extLst>
           </p:cNvPr>
@@ -5518,8 +5456,8 @@
           <a:p>
             <a:pPr algn="ctr"/>
             <a:r>
-              <a:rPr lang="en-US" dirty="0"/>
-              <a:t>Marni Tasks </a:t>
+              <a:rPr lang="en-US" b="1" dirty="0"/>
+              <a:t>Marni Tasks</a:t>
             </a:r>
           </a:p>
         </p:txBody>
@@ -5529,7 +5467,7 @@
           <p:cNvPr id="3" name="Content Placeholder 2">
             <a:extLst>
               <a:ext uri="{FF2B5EF4-FFF2-40B4-BE49-F238E27FC236}">
-                <a16:creationId xmlns:a16="http://schemas.microsoft.com/office/drawing/2014/main" id="{1DE45E93-56C2-48E0-A4A4-2671F889352D}"/>
+                <a16:creationId xmlns:a16="http://schemas.microsoft.com/office/drawing/2014/main" id="{260DD9DF-5B04-48C4-AD27-3D7015D506FB}"/>
               </a:ext>
             </a:extLst>
           </p:cNvPr>
@@ -5542,23 +5480,41 @@
         </p:nvSpPr>
         <p:spPr>
           <a:xfrm>
-            <a:off x="838200" y="4379495"/>
-            <a:ext cx="10515600" cy="1797468"/>
+            <a:off x="838200" y="3428999"/>
+            <a:ext cx="10515600" cy="2948049"/>
           </a:xfrm>
         </p:spPr>
         <p:txBody>
-          <a:bodyPr/>
-          <a:lstStyle/>
-          <a:p>
+          <a:bodyPr>
+            <a:normAutofit lnSpcReduction="10000"/>
+          </a:bodyPr>
+          <a:lstStyle/>
+          <a:p>
+            <a:pPr algn="just"/>
             <a:r>
               <a:rPr lang="en-US" dirty="0"/>
-              <a:t>Marni’s Task was to created Radial Scale Chart for visualize.</a:t>
-            </a:r>
-          </a:p>
-          <a:p>
+              <a:t>to compile all the total statistics of confirmed, death and recovered cases in Summary Tiles form.</a:t>
+            </a:r>
+          </a:p>
+          <a:p>
+            <a:pPr algn="just"/>
             <a:r>
               <a:rPr lang="en-US" dirty="0"/>
-              <a:t>Radial Scale Chart used to emphasize cyclical patterns.</a:t>
+              <a:t>A summary tile can be a powerful way to put attention to one, or several important statistics such as number of Confirmed case. </a:t>
+            </a:r>
+          </a:p>
+          <a:p>
+            <a:pPr algn="just"/>
+            <a:r>
+              <a:rPr lang="en-US" dirty="0"/>
+              <a:t>This can help to set tone for the rest of the Dashboard.</a:t>
+            </a:r>
+          </a:p>
+          <a:p>
+            <a:pPr algn="just"/>
+            <a:r>
+              <a:rPr lang="en-US" dirty="0"/>
+              <a:t>Different colors were used to show the significance for each summary tiles</a:t>
             </a:r>
           </a:p>
           <a:p>
@@ -5568,10 +5524,10 @@
       </p:sp>
       <p:pic>
         <p:nvPicPr>
-          <p:cNvPr id="4" name="Picture 3">
-            <a:extLst>
-              <a:ext uri="{FF2B5EF4-FFF2-40B4-BE49-F238E27FC236}">
-                <a16:creationId xmlns:a16="http://schemas.microsoft.com/office/drawing/2014/main" id="{92342B07-2609-4917-8363-03D8CA8B0952}"/>
+          <p:cNvPr id="4" name="Content Placeholder 3">
+            <a:extLst>
+              <a:ext uri="{FF2B5EF4-FFF2-40B4-BE49-F238E27FC236}">
+                <a16:creationId xmlns:a16="http://schemas.microsoft.com/office/drawing/2014/main" id="{0A5DB94C-A0FF-488D-BD07-3B873E38FF4D}"/>
               </a:ext>
             </a:extLst>
           </p:cNvPr>
@@ -5582,13 +5538,13 @@
         </p:nvPicPr>
         <p:blipFill rotWithShape="1">
           <a:blip r:embed="rId2"/>
-          <a:srcRect l="9758" t="22266" r="48955" b="6667"/>
+          <a:srcRect t="13946" r="1188" b="59939"/>
           <a:stretch/>
         </p:blipFill>
         <p:spPr>
           <a:xfrm>
-            <a:off x="4509857" y="1411564"/>
-            <a:ext cx="2982897" cy="2888202"/>
+            <a:off x="677399" y="1484416"/>
+            <a:ext cx="10837202" cy="1611074"/>
           </a:xfrm>
           <a:prstGeom prst="rect">
             <a:avLst/>
@@ -5598,7 +5554,7 @@
     </p:spTree>
     <p:extLst>
       <p:ext uri="{BB962C8B-B14F-4D97-AF65-F5344CB8AC3E}">
-        <p14:creationId xmlns:p14="http://schemas.microsoft.com/office/powerpoint/2010/main" val="3453718954"/>
+        <p14:creationId xmlns:p14="http://schemas.microsoft.com/office/powerpoint/2010/main" val="829678602"/>
       </p:ext>
     </p:extLst>
   </p:cSld>
@@ -5630,7 +5586,7 @@
           <p:cNvPr id="2" name="Title 1">
             <a:extLst>
               <a:ext uri="{FF2B5EF4-FFF2-40B4-BE49-F238E27FC236}">
-                <a16:creationId xmlns:a16="http://schemas.microsoft.com/office/drawing/2014/main" id="{166200F9-E330-4241-AE28-2B92DE523A77}"/>
+                <a16:creationId xmlns:a16="http://schemas.microsoft.com/office/drawing/2014/main" id="{FCB00F2D-15A5-4530-85B3-86A3D8BDB9E5}"/>
               </a:ext>
             </a:extLst>
           </p:cNvPr>
@@ -5641,93 +5597,16 @@
             <p:ph type="title"/>
           </p:nvPr>
         </p:nvSpPr>
-        <p:spPr>
-          <a:xfrm>
-            <a:off x="625136" y="-241711"/>
-            <a:ext cx="10515600" cy="1325563"/>
-          </a:xfrm>
-        </p:spPr>
+        <p:spPr/>
         <p:txBody>
           <a:bodyPr/>
           <a:lstStyle/>
           <a:p>
             <a:pPr algn="ctr"/>
             <a:r>
-              <a:rPr lang="en-US" dirty="0" err="1"/>
-              <a:t>Haziq</a:t>
-            </a:r>
-            <a:r>
-              <a:rPr lang="en-US" dirty="0"/>
-              <a:t> Task</a:t>
-            </a:r>
-          </a:p>
-        </p:txBody>
-      </p:sp>
-      <p:sp>
-        <p:nvSpPr>
-          <p:cNvPr id="3" name="Content Placeholder 2">
-            <a:extLst>
-              <a:ext uri="{FF2B5EF4-FFF2-40B4-BE49-F238E27FC236}">
-                <a16:creationId xmlns:a16="http://schemas.microsoft.com/office/drawing/2014/main" id="{14C0FA9B-0D59-4101-833A-5835429CBAC2}"/>
-              </a:ext>
-            </a:extLst>
-          </p:cNvPr>
-          <p:cNvSpPr>
-            <a:spLocks noGrp="1"/>
-          </p:cNvSpPr>
-          <p:nvPr>
-            <p:ph idx="1"/>
-          </p:nvPr>
-        </p:nvSpPr>
-        <p:spPr>
-          <a:xfrm>
-            <a:off x="838200" y="4001287"/>
-            <a:ext cx="10515600" cy="2506045"/>
-          </a:xfrm>
-        </p:spPr>
-        <p:txBody>
-          <a:bodyPr>
-            <a:normAutofit fontScale="92500" lnSpcReduction="20000"/>
-          </a:bodyPr>
-          <a:lstStyle/>
-          <a:p>
-            <a:r>
-              <a:rPr lang="en-US" dirty="0" err="1"/>
-              <a:t>Haziq’s</a:t>
-            </a:r>
-            <a:r>
-              <a:rPr lang="en-US" dirty="0"/>
-              <a:t> task was to created interactive map that shows individual country with information by hovering around using tooltip. </a:t>
-            </a:r>
-          </a:p>
-          <a:p>
-            <a:r>
-              <a:rPr lang="en-US" dirty="0"/>
-              <a:t>Each country contains the name, number of confirmed cases, deaths and recovered.  </a:t>
-            </a:r>
-          </a:p>
-          <a:p>
-            <a:r>
-              <a:rPr lang="en-US" dirty="0"/>
-              <a:t>Zooming capabilities with d3 zoom function.</a:t>
-            </a:r>
-          </a:p>
-          <a:p>
-            <a:r>
-              <a:rPr lang="en-US" dirty="0"/>
-              <a:t>Utilizing </a:t>
-            </a:r>
-            <a:r>
-              <a:rPr lang="en-US" dirty="0" err="1"/>
-              <a:t>topojson</a:t>
-            </a:r>
-            <a:r>
-              <a:rPr lang="en-US" dirty="0"/>
-              <a:t> dataset by linking country id with covid-19 dataset to fetch necessary data and features. </a:t>
-            </a:r>
-          </a:p>
-          <a:p>
-            <a:endParaRPr lang="en-US" dirty="0"/>
+              <a:rPr lang="en-US" b="1" dirty="0"/>
+              <a:t>Marni Tasks </a:t>
+            </a:r>
           </a:p>
         </p:txBody>
       </p:sp>
@@ -5736,7 +5615,7 @@
           <p:cNvPr id="4" name="Picture 3">
             <a:extLst>
               <a:ext uri="{FF2B5EF4-FFF2-40B4-BE49-F238E27FC236}">
-                <a16:creationId xmlns:a16="http://schemas.microsoft.com/office/drawing/2014/main" id="{B03873DF-4687-4E27-AE63-088B54A0B9F7}"/>
+                <a16:creationId xmlns:a16="http://schemas.microsoft.com/office/drawing/2014/main" id="{92342B07-2609-4917-8363-03D8CA8B0952}"/>
               </a:ext>
             </a:extLst>
           </p:cNvPr>
@@ -5747,23 +5626,68 @@
         </p:nvPicPr>
         <p:blipFill rotWithShape="1">
           <a:blip r:embed="rId2"/>
-          <a:srcRect l="13762" t="22006" r="12912" b="34757"/>
+          <a:srcRect l="9758" t="22266" r="48955" b="6667"/>
           <a:stretch/>
         </p:blipFill>
         <p:spPr>
           <a:xfrm>
-            <a:off x="1365413" y="773135"/>
-            <a:ext cx="9017762" cy="2990997"/>
+            <a:off x="510639" y="1380879"/>
+            <a:ext cx="5225143" cy="5059265"/>
           </a:xfrm>
           <a:prstGeom prst="rect">
             <a:avLst/>
           </a:prstGeom>
         </p:spPr>
       </p:pic>
+      <p:sp>
+        <p:nvSpPr>
+          <p:cNvPr id="5" name="Content Placeholder 4"/>
+          <p:cNvSpPr>
+            <a:spLocks noGrp="1"/>
+          </p:cNvSpPr>
+          <p:nvPr>
+            <p:ph idx="1"/>
+          </p:nvPr>
+        </p:nvSpPr>
+        <p:spPr>
+          <a:xfrm>
+            <a:off x="5949538" y="1825625"/>
+            <a:ext cx="5404262" cy="4351338"/>
+          </a:xfrm>
+        </p:spPr>
+        <p:txBody>
+          <a:bodyPr/>
+          <a:lstStyle/>
+          <a:p>
+            <a:pPr algn="just"/>
+            <a:r>
+              <a:rPr lang="en-US" dirty="0"/>
+              <a:t>Radial Stacked Bar Chart to visualize Top 15 Countries w/ Confirmed Cases.</a:t>
+            </a:r>
+          </a:p>
+          <a:p>
+            <a:pPr algn="just"/>
+            <a:r>
+              <a:rPr lang="en-US" dirty="0"/>
+              <a:t>To compare countries total cases, different colors were used similarly w/ the Summary Tiles to show the significance of each total number of cases</a:t>
+            </a:r>
+          </a:p>
+          <a:p>
+            <a:pPr algn="just"/>
+            <a:r>
+              <a:rPr lang="en-US" dirty="0"/>
+              <a:t>Radial shape is to visualize the world</a:t>
+            </a:r>
+          </a:p>
+          <a:p>
+            <a:endParaRPr lang="en-MY" dirty="0"/>
+          </a:p>
+        </p:txBody>
+      </p:sp>
     </p:spTree>
     <p:extLst>
       <p:ext uri="{BB962C8B-B14F-4D97-AF65-F5344CB8AC3E}">
-        <p14:creationId xmlns:p14="http://schemas.microsoft.com/office/powerpoint/2010/main" val="1770772489"/>
+        <p14:creationId xmlns:p14="http://schemas.microsoft.com/office/powerpoint/2010/main" val="3453718954"/>
       </p:ext>
     </p:extLst>
   </p:cSld>

</xml_diff>